<commit_message>
feat: Add radar chart generation and report creation functionality; update requirements and .gitignore
</commit_message>
<xml_diff>
--- a/db/Plantilla para automatización de tendencias.pptx
+++ b/db/Plantilla para automatización de tendencias.pptx
@@ -1823,148 +1823,6 @@
     </pc:docChg>
   </pc:docChgLst>
   <pc:docChgLst>
-    <pc:chgData name="Doménica Nicole Villalva Dalgo" userId="S::domenica.villalva.dalgo@udla.edu.ec::f51868b3-dda2-4923-93bb-a3e9203f39dc" providerId="AD" clId="Web-{70031A14-71AE-BC99-D535-21990E3CD646}"/>
-    <pc:docChg chg="modSld">
-      <pc:chgData name="Doménica Nicole Villalva Dalgo" userId="S::domenica.villalva.dalgo@udla.edu.ec::f51868b3-dda2-4923-93bb-a3e9203f39dc" providerId="AD" clId="Web-{70031A14-71AE-BC99-D535-21990E3CD646}" dt="2025-08-29T13:57:10.805" v="24" actId="20577"/>
-      <pc:docMkLst>
-        <pc:docMk/>
-      </pc:docMkLst>
-      <pc:sldChg chg="modSp">
-        <pc:chgData name="Doménica Nicole Villalva Dalgo" userId="S::domenica.villalva.dalgo@udla.edu.ec::f51868b3-dda2-4923-93bb-a3e9203f39dc" providerId="AD" clId="Web-{70031A14-71AE-BC99-D535-21990E3CD646}" dt="2025-08-27T21:09:46.712" v="12" actId="1076"/>
-        <pc:sldMkLst>
-          <pc:docMk/>
-          <pc:sldMk cId="800599192" sldId="1502"/>
-        </pc:sldMkLst>
-        <pc:spChg chg="mod">
-          <ac:chgData name="Doménica Nicole Villalva Dalgo" userId="S::domenica.villalva.dalgo@udla.edu.ec::f51868b3-dda2-4923-93bb-a3e9203f39dc" providerId="AD" clId="Web-{70031A14-71AE-BC99-D535-21990E3CD646}" dt="2025-08-27T21:09:46.665" v="8" actId="1076"/>
-          <ac:spMkLst>
-            <pc:docMk/>
-            <pc:sldMk cId="800599192" sldId="1502"/>
-            <ac:spMk id="9" creationId="{BFAE98E2-9649-FC77-87E1-0DD96F97DA95}"/>
-          </ac:spMkLst>
-        </pc:spChg>
-        <pc:spChg chg="mod">
-          <ac:chgData name="Doménica Nicole Villalva Dalgo" userId="S::domenica.villalva.dalgo@udla.edu.ec::f51868b3-dda2-4923-93bb-a3e9203f39dc" providerId="AD" clId="Web-{70031A14-71AE-BC99-D535-21990E3CD646}" dt="2025-08-27T21:09:38.868" v="6" actId="1076"/>
-          <ac:spMkLst>
-            <pc:docMk/>
-            <pc:sldMk cId="800599192" sldId="1502"/>
-            <ac:spMk id="12" creationId="{190B4974-3E22-ED45-B4A4-193F34DA30CB}"/>
-          </ac:spMkLst>
-        </pc:spChg>
-        <pc:spChg chg="mod">
-          <ac:chgData name="Doménica Nicole Villalva Dalgo" userId="S::domenica.villalva.dalgo@udla.edu.ec::f51868b3-dda2-4923-93bb-a3e9203f39dc" providerId="AD" clId="Web-{70031A14-71AE-BC99-D535-21990E3CD646}" dt="2025-08-27T21:09:46.680" v="10" actId="1076"/>
-          <ac:spMkLst>
-            <pc:docMk/>
-            <pc:sldMk cId="800599192" sldId="1502"/>
-            <ac:spMk id="15" creationId="{EAF9BFC9-5EAD-A142-69C5-58353C4AC899}"/>
-          </ac:spMkLst>
-        </pc:spChg>
-        <pc:spChg chg="mod">
-          <ac:chgData name="Doménica Nicole Villalva Dalgo" userId="S::domenica.villalva.dalgo@udla.edu.ec::f51868b3-dda2-4923-93bb-a3e9203f39dc" providerId="AD" clId="Web-{70031A14-71AE-BC99-D535-21990E3CD646}" dt="2025-08-27T21:09:46.712" v="12" actId="1076"/>
-          <ac:spMkLst>
-            <pc:docMk/>
-            <pc:sldMk cId="800599192" sldId="1502"/>
-            <ac:spMk id="21" creationId="{FAF17A27-AC96-BBB1-F325-2FA5768A9AA4}"/>
-          </ac:spMkLst>
-        </pc:spChg>
-        <pc:picChg chg="mod">
-          <ac:chgData name="Doménica Nicole Villalva Dalgo" userId="S::domenica.villalva.dalgo@udla.edu.ec::f51868b3-dda2-4923-93bb-a3e9203f39dc" providerId="AD" clId="Web-{70031A14-71AE-BC99-D535-21990E3CD646}" dt="2025-08-27T21:09:38.884" v="7" actId="1076"/>
-          <ac:picMkLst>
-            <pc:docMk/>
-            <pc:sldMk cId="800599192" sldId="1502"/>
-            <ac:picMk id="6" creationId="{865D0DED-0709-6651-8F57-A03596E6FC53}"/>
-          </ac:picMkLst>
-        </pc:picChg>
-        <pc:picChg chg="mod">
-          <ac:chgData name="Doménica Nicole Villalva Dalgo" userId="S::domenica.villalva.dalgo@udla.edu.ec::f51868b3-dda2-4923-93bb-a3e9203f39dc" providerId="AD" clId="Web-{70031A14-71AE-BC99-D535-21990E3CD646}" dt="2025-08-27T21:09:46.680" v="9" actId="1076"/>
-          <ac:picMkLst>
-            <pc:docMk/>
-            <pc:sldMk cId="800599192" sldId="1502"/>
-            <ac:picMk id="16" creationId="{F71B090B-184A-2497-8411-BE436760F0B2}"/>
-          </ac:picMkLst>
-        </pc:picChg>
-        <pc:picChg chg="mod">
-          <ac:chgData name="Doménica Nicole Villalva Dalgo" userId="S::domenica.villalva.dalgo@udla.edu.ec::f51868b3-dda2-4923-93bb-a3e9203f39dc" providerId="AD" clId="Web-{70031A14-71AE-BC99-D535-21990E3CD646}" dt="2025-08-27T21:09:32.837" v="3" actId="1076"/>
-          <ac:picMkLst>
-            <pc:docMk/>
-            <pc:sldMk cId="800599192" sldId="1502"/>
-            <ac:picMk id="17" creationId="{C3C86FF3-A32A-DE9C-08A5-5014E9A057C0}"/>
-          </ac:picMkLst>
-        </pc:picChg>
-        <pc:picChg chg="mod">
-          <ac:chgData name="Doménica Nicole Villalva Dalgo" userId="S::domenica.villalva.dalgo@udla.edu.ec::f51868b3-dda2-4923-93bb-a3e9203f39dc" providerId="AD" clId="Web-{70031A14-71AE-BC99-D535-21990E3CD646}" dt="2025-08-27T21:09:46.696" v="11" actId="1076"/>
-          <ac:picMkLst>
-            <pc:docMk/>
-            <pc:sldMk cId="800599192" sldId="1502"/>
-            <ac:picMk id="19" creationId="{8ECF1019-8B2D-699F-811D-1D843E009539}"/>
-          </ac:picMkLst>
-        </pc:picChg>
-      </pc:sldChg>
-      <pc:sldChg chg="delSp modSp delAnim">
-        <pc:chgData name="Doménica Nicole Villalva Dalgo" userId="S::domenica.villalva.dalgo@udla.edu.ec::f51868b3-dda2-4923-93bb-a3e9203f39dc" providerId="AD" clId="Web-{70031A14-71AE-BC99-D535-21990E3CD646}" dt="2025-08-27T21:11:24.461" v="16" actId="14100"/>
-        <pc:sldMkLst>
-          <pc:docMk/>
-          <pc:sldMk cId="2921240800" sldId="1506"/>
-        </pc:sldMkLst>
-        <pc:spChg chg="mod">
-          <ac:chgData name="Doménica Nicole Villalva Dalgo" userId="S::domenica.villalva.dalgo@udla.edu.ec::f51868b3-dda2-4923-93bb-a3e9203f39dc" providerId="AD" clId="Web-{70031A14-71AE-BC99-D535-21990E3CD646}" dt="2025-08-27T21:11:24.461" v="16" actId="14100"/>
-          <ac:spMkLst>
-            <pc:docMk/>
-            <pc:sldMk cId="2921240800" sldId="1506"/>
-            <ac:spMk id="10" creationId="{469B025C-40E3-50E5-2F61-488FFDBA45DC}"/>
-          </ac:spMkLst>
-        </pc:spChg>
-      </pc:sldChg>
-      <pc:sldChg chg="modSp">
-        <pc:chgData name="Doménica Nicole Villalva Dalgo" userId="S::domenica.villalva.dalgo@udla.edu.ec::f51868b3-dda2-4923-93bb-a3e9203f39dc" providerId="AD" clId="Web-{70031A14-71AE-BC99-D535-21990E3CD646}" dt="2025-08-29T13:57:10.805" v="24" actId="20577"/>
-        <pc:sldMkLst>
-          <pc:docMk/>
-          <pc:sldMk cId="38969851" sldId="1519"/>
-        </pc:sldMkLst>
-        <pc:spChg chg="mod">
-          <ac:chgData name="Doménica Nicole Villalva Dalgo" userId="S::domenica.villalva.dalgo@udla.edu.ec::f51868b3-dda2-4923-93bb-a3e9203f39dc" providerId="AD" clId="Web-{70031A14-71AE-BC99-D535-21990E3CD646}" dt="2025-08-29T13:54:07.772" v="17" actId="14100"/>
-          <ac:spMkLst>
-            <pc:docMk/>
-            <pc:sldMk cId="38969851" sldId="1519"/>
-            <ac:spMk id="8" creationId="{AC5A4F47-3131-BA58-3607-57D7BB8EEC04}"/>
-          </ac:spMkLst>
-        </pc:spChg>
-        <pc:spChg chg="mod">
-          <ac:chgData name="Doménica Nicole Villalva Dalgo" userId="S::domenica.villalva.dalgo@udla.edu.ec::f51868b3-dda2-4923-93bb-a3e9203f39dc" providerId="AD" clId="Web-{70031A14-71AE-BC99-D535-21990E3CD646}" dt="2025-08-29T13:54:16.897" v="19" actId="14100"/>
-          <ac:spMkLst>
-            <pc:docMk/>
-            <pc:sldMk cId="38969851" sldId="1519"/>
-            <ac:spMk id="12" creationId="{EF487A04-464E-F4D0-EEE7-6BD884FB02C0}"/>
-          </ac:spMkLst>
-        </pc:spChg>
-        <pc:spChg chg="mod">
-          <ac:chgData name="Doménica Nicole Villalva Dalgo" userId="S::domenica.villalva.dalgo@udla.edu.ec::f51868b3-dda2-4923-93bb-a3e9203f39dc" providerId="AD" clId="Web-{70031A14-71AE-BC99-D535-21990E3CD646}" dt="2025-08-29T13:54:12.975" v="18" actId="14100"/>
-          <ac:spMkLst>
-            <pc:docMk/>
-            <pc:sldMk cId="38969851" sldId="1519"/>
-            <ac:spMk id="13" creationId="{3A91C7D2-4A47-3EFF-A452-DBEB60F25209}"/>
-          </ac:spMkLst>
-        </pc:spChg>
-        <pc:spChg chg="mod">
-          <ac:chgData name="Doménica Nicole Villalva Dalgo" userId="S::domenica.villalva.dalgo@udla.edu.ec::f51868b3-dda2-4923-93bb-a3e9203f39dc" providerId="AD" clId="Web-{70031A14-71AE-BC99-D535-21990E3CD646}" dt="2025-08-29T13:54:20.178" v="20" actId="14100"/>
-          <ac:spMkLst>
-            <pc:docMk/>
-            <pc:sldMk cId="38969851" sldId="1519"/>
-            <ac:spMk id="14" creationId="{A5FC5A67-0331-4D4B-3E77-BC5EA11BF5BC}"/>
-          </ac:spMkLst>
-        </pc:spChg>
-        <pc:spChg chg="mod">
-          <ac:chgData name="Doménica Nicole Villalva Dalgo" userId="S::domenica.villalva.dalgo@udla.edu.ec::f51868b3-dda2-4923-93bb-a3e9203f39dc" providerId="AD" clId="Web-{70031A14-71AE-BC99-D535-21990E3CD646}" dt="2025-08-29T13:57:10.805" v="24" actId="20577"/>
-          <ac:spMkLst>
-            <pc:docMk/>
-            <pc:sldMk cId="38969851" sldId="1519"/>
-            <ac:spMk id="15" creationId="{27146F19-3D27-98BD-CB56-6535E1BF8869}"/>
-          </ac:spMkLst>
-        </pc:spChg>
-      </pc:sldChg>
-    </pc:docChg>
-  </pc:docChgLst>
-  <pc:docChgLst>
     <pc:chgData name="Dillan Alexander Cruz" userId="3dbe1210-6b98-467c-96cc-82662ffab190" providerId="ADAL" clId="{EAF05DF7-8FF3-417F-85FA-C24449DC6A42}"/>
     <pc:docChg chg="undo custSel addSld delSld modSld sldOrd">
       <pc:chgData name="Dillan Alexander Cruz" userId="3dbe1210-6b98-467c-96cc-82662ffab190" providerId="ADAL" clId="{EAF05DF7-8FF3-417F-85FA-C24449DC6A42}" dt="2025-08-27T21:25:16.510" v="1675"/>
@@ -2462,13 +2320,155 @@
       </pc:sldChg>
     </pc:docChg>
   </pc:docChgLst>
+  <pc:docChgLst>
+    <pc:chgData name="Doménica Nicole Villalva Dalgo" userId="S::domenica.villalva.dalgo@udla.edu.ec::f51868b3-dda2-4923-93bb-a3e9203f39dc" providerId="AD" clId="Web-{70031A14-71AE-BC99-D535-21990E3CD646}"/>
+    <pc:docChg chg="modSld">
+      <pc:chgData name="Doménica Nicole Villalva Dalgo" userId="S::domenica.villalva.dalgo@udla.edu.ec::f51868b3-dda2-4923-93bb-a3e9203f39dc" providerId="AD" clId="Web-{70031A14-71AE-BC99-D535-21990E3CD646}" dt="2025-08-29T13:57:10.805" v="24" actId="20577"/>
+      <pc:docMkLst>
+        <pc:docMk/>
+      </pc:docMkLst>
+      <pc:sldChg chg="modSp">
+        <pc:chgData name="Doménica Nicole Villalva Dalgo" userId="S::domenica.villalva.dalgo@udla.edu.ec::f51868b3-dda2-4923-93bb-a3e9203f39dc" providerId="AD" clId="Web-{70031A14-71AE-BC99-D535-21990E3CD646}" dt="2025-08-27T21:09:46.712" v="12" actId="1076"/>
+        <pc:sldMkLst>
+          <pc:docMk/>
+          <pc:sldMk cId="800599192" sldId="1502"/>
+        </pc:sldMkLst>
+        <pc:spChg chg="mod">
+          <ac:chgData name="Doménica Nicole Villalva Dalgo" userId="S::domenica.villalva.dalgo@udla.edu.ec::f51868b3-dda2-4923-93bb-a3e9203f39dc" providerId="AD" clId="Web-{70031A14-71AE-BC99-D535-21990E3CD646}" dt="2025-08-27T21:09:46.665" v="8" actId="1076"/>
+          <ac:spMkLst>
+            <pc:docMk/>
+            <pc:sldMk cId="800599192" sldId="1502"/>
+            <ac:spMk id="9" creationId="{BFAE98E2-9649-FC77-87E1-0DD96F97DA95}"/>
+          </ac:spMkLst>
+        </pc:spChg>
+        <pc:spChg chg="mod">
+          <ac:chgData name="Doménica Nicole Villalva Dalgo" userId="S::domenica.villalva.dalgo@udla.edu.ec::f51868b3-dda2-4923-93bb-a3e9203f39dc" providerId="AD" clId="Web-{70031A14-71AE-BC99-D535-21990E3CD646}" dt="2025-08-27T21:09:38.868" v="6" actId="1076"/>
+          <ac:spMkLst>
+            <pc:docMk/>
+            <pc:sldMk cId="800599192" sldId="1502"/>
+            <ac:spMk id="12" creationId="{190B4974-3E22-ED45-B4A4-193F34DA30CB}"/>
+          </ac:spMkLst>
+        </pc:spChg>
+        <pc:spChg chg="mod">
+          <ac:chgData name="Doménica Nicole Villalva Dalgo" userId="S::domenica.villalva.dalgo@udla.edu.ec::f51868b3-dda2-4923-93bb-a3e9203f39dc" providerId="AD" clId="Web-{70031A14-71AE-BC99-D535-21990E3CD646}" dt="2025-08-27T21:09:46.680" v="10" actId="1076"/>
+          <ac:spMkLst>
+            <pc:docMk/>
+            <pc:sldMk cId="800599192" sldId="1502"/>
+            <ac:spMk id="15" creationId="{EAF9BFC9-5EAD-A142-69C5-58353C4AC899}"/>
+          </ac:spMkLst>
+        </pc:spChg>
+        <pc:spChg chg="mod">
+          <ac:chgData name="Doménica Nicole Villalva Dalgo" userId="S::domenica.villalva.dalgo@udla.edu.ec::f51868b3-dda2-4923-93bb-a3e9203f39dc" providerId="AD" clId="Web-{70031A14-71AE-BC99-D535-21990E3CD646}" dt="2025-08-27T21:09:46.712" v="12" actId="1076"/>
+          <ac:spMkLst>
+            <pc:docMk/>
+            <pc:sldMk cId="800599192" sldId="1502"/>
+            <ac:spMk id="21" creationId="{FAF17A27-AC96-BBB1-F325-2FA5768A9AA4}"/>
+          </ac:spMkLst>
+        </pc:spChg>
+        <pc:picChg chg="mod">
+          <ac:chgData name="Doménica Nicole Villalva Dalgo" userId="S::domenica.villalva.dalgo@udla.edu.ec::f51868b3-dda2-4923-93bb-a3e9203f39dc" providerId="AD" clId="Web-{70031A14-71AE-BC99-D535-21990E3CD646}" dt="2025-08-27T21:09:38.884" v="7" actId="1076"/>
+          <ac:picMkLst>
+            <pc:docMk/>
+            <pc:sldMk cId="800599192" sldId="1502"/>
+            <ac:picMk id="6" creationId="{865D0DED-0709-6651-8F57-A03596E6FC53}"/>
+          </ac:picMkLst>
+        </pc:picChg>
+        <pc:picChg chg="mod">
+          <ac:chgData name="Doménica Nicole Villalva Dalgo" userId="S::domenica.villalva.dalgo@udla.edu.ec::f51868b3-dda2-4923-93bb-a3e9203f39dc" providerId="AD" clId="Web-{70031A14-71AE-BC99-D535-21990E3CD646}" dt="2025-08-27T21:09:46.680" v="9" actId="1076"/>
+          <ac:picMkLst>
+            <pc:docMk/>
+            <pc:sldMk cId="800599192" sldId="1502"/>
+            <ac:picMk id="16" creationId="{F71B090B-184A-2497-8411-BE436760F0B2}"/>
+          </ac:picMkLst>
+        </pc:picChg>
+        <pc:picChg chg="mod">
+          <ac:chgData name="Doménica Nicole Villalva Dalgo" userId="S::domenica.villalva.dalgo@udla.edu.ec::f51868b3-dda2-4923-93bb-a3e9203f39dc" providerId="AD" clId="Web-{70031A14-71AE-BC99-D535-21990E3CD646}" dt="2025-08-27T21:09:32.837" v="3" actId="1076"/>
+          <ac:picMkLst>
+            <pc:docMk/>
+            <pc:sldMk cId="800599192" sldId="1502"/>
+            <ac:picMk id="17" creationId="{C3C86FF3-A32A-DE9C-08A5-5014E9A057C0}"/>
+          </ac:picMkLst>
+        </pc:picChg>
+        <pc:picChg chg="mod">
+          <ac:chgData name="Doménica Nicole Villalva Dalgo" userId="S::domenica.villalva.dalgo@udla.edu.ec::f51868b3-dda2-4923-93bb-a3e9203f39dc" providerId="AD" clId="Web-{70031A14-71AE-BC99-D535-21990E3CD646}" dt="2025-08-27T21:09:46.696" v="11" actId="1076"/>
+          <ac:picMkLst>
+            <pc:docMk/>
+            <pc:sldMk cId="800599192" sldId="1502"/>
+            <ac:picMk id="19" creationId="{8ECF1019-8B2D-699F-811D-1D843E009539}"/>
+          </ac:picMkLst>
+        </pc:picChg>
+      </pc:sldChg>
+      <pc:sldChg chg="delSp modSp delAnim">
+        <pc:chgData name="Doménica Nicole Villalva Dalgo" userId="S::domenica.villalva.dalgo@udla.edu.ec::f51868b3-dda2-4923-93bb-a3e9203f39dc" providerId="AD" clId="Web-{70031A14-71AE-BC99-D535-21990E3CD646}" dt="2025-08-27T21:11:24.461" v="16" actId="14100"/>
+        <pc:sldMkLst>
+          <pc:docMk/>
+          <pc:sldMk cId="2921240800" sldId="1506"/>
+        </pc:sldMkLst>
+        <pc:spChg chg="mod">
+          <ac:chgData name="Doménica Nicole Villalva Dalgo" userId="S::domenica.villalva.dalgo@udla.edu.ec::f51868b3-dda2-4923-93bb-a3e9203f39dc" providerId="AD" clId="Web-{70031A14-71AE-BC99-D535-21990E3CD646}" dt="2025-08-27T21:11:24.461" v="16" actId="14100"/>
+          <ac:spMkLst>
+            <pc:docMk/>
+            <pc:sldMk cId="2921240800" sldId="1506"/>
+            <ac:spMk id="10" creationId="{469B025C-40E3-50E5-2F61-488FFDBA45DC}"/>
+          </ac:spMkLst>
+        </pc:spChg>
+      </pc:sldChg>
+      <pc:sldChg chg="modSp">
+        <pc:chgData name="Doménica Nicole Villalva Dalgo" userId="S::domenica.villalva.dalgo@udla.edu.ec::f51868b3-dda2-4923-93bb-a3e9203f39dc" providerId="AD" clId="Web-{70031A14-71AE-BC99-D535-21990E3CD646}" dt="2025-08-29T13:57:10.805" v="24" actId="20577"/>
+        <pc:sldMkLst>
+          <pc:docMk/>
+          <pc:sldMk cId="38969851" sldId="1519"/>
+        </pc:sldMkLst>
+        <pc:spChg chg="mod">
+          <ac:chgData name="Doménica Nicole Villalva Dalgo" userId="S::domenica.villalva.dalgo@udla.edu.ec::f51868b3-dda2-4923-93bb-a3e9203f39dc" providerId="AD" clId="Web-{70031A14-71AE-BC99-D535-21990E3CD646}" dt="2025-08-29T13:54:07.772" v="17" actId="14100"/>
+          <ac:spMkLst>
+            <pc:docMk/>
+            <pc:sldMk cId="38969851" sldId="1519"/>
+            <ac:spMk id="8" creationId="{AC5A4F47-3131-BA58-3607-57D7BB8EEC04}"/>
+          </ac:spMkLst>
+        </pc:spChg>
+        <pc:spChg chg="mod">
+          <ac:chgData name="Doménica Nicole Villalva Dalgo" userId="S::domenica.villalva.dalgo@udla.edu.ec::f51868b3-dda2-4923-93bb-a3e9203f39dc" providerId="AD" clId="Web-{70031A14-71AE-BC99-D535-21990E3CD646}" dt="2025-08-29T13:54:16.897" v="19" actId="14100"/>
+          <ac:spMkLst>
+            <pc:docMk/>
+            <pc:sldMk cId="38969851" sldId="1519"/>
+            <ac:spMk id="12" creationId="{EF487A04-464E-F4D0-EEE7-6BD884FB02C0}"/>
+          </ac:spMkLst>
+        </pc:spChg>
+        <pc:spChg chg="mod">
+          <ac:chgData name="Doménica Nicole Villalva Dalgo" userId="S::domenica.villalva.dalgo@udla.edu.ec::f51868b3-dda2-4923-93bb-a3e9203f39dc" providerId="AD" clId="Web-{70031A14-71AE-BC99-D535-21990E3CD646}" dt="2025-08-29T13:54:12.975" v="18" actId="14100"/>
+          <ac:spMkLst>
+            <pc:docMk/>
+            <pc:sldMk cId="38969851" sldId="1519"/>
+            <ac:spMk id="13" creationId="{3A91C7D2-4A47-3EFF-A452-DBEB60F25209}"/>
+          </ac:spMkLst>
+        </pc:spChg>
+        <pc:spChg chg="mod">
+          <ac:chgData name="Doménica Nicole Villalva Dalgo" userId="S::domenica.villalva.dalgo@udla.edu.ec::f51868b3-dda2-4923-93bb-a3e9203f39dc" providerId="AD" clId="Web-{70031A14-71AE-BC99-D535-21990E3CD646}" dt="2025-08-29T13:54:20.178" v="20" actId="14100"/>
+          <ac:spMkLst>
+            <pc:docMk/>
+            <pc:sldMk cId="38969851" sldId="1519"/>
+            <ac:spMk id="14" creationId="{A5FC5A67-0331-4D4B-3E77-BC5EA11BF5BC}"/>
+          </ac:spMkLst>
+        </pc:spChg>
+        <pc:spChg chg="mod">
+          <ac:chgData name="Doménica Nicole Villalva Dalgo" userId="S::domenica.villalva.dalgo@udla.edu.ec::f51868b3-dda2-4923-93bb-a3e9203f39dc" providerId="AD" clId="Web-{70031A14-71AE-BC99-D535-21990E3CD646}" dt="2025-08-29T13:57:10.805" v="24" actId="20577"/>
+          <ac:spMkLst>
+            <pc:docMk/>
+            <pc:sldMk cId="38969851" sldId="1519"/>
+            <ac:spMk id="15" creationId="{27146F19-3D27-98BD-CB56-6535E1BF8869}"/>
+          </ac:spMkLst>
+        </pc:spChg>
+      </pc:sldChg>
+    </pc:docChg>
+  </pc:docChgLst>
 </pc:chgInfo>
 </file>
 
 <file path=ppt/charts/chart1.xml><?xml version="1.0" encoding="utf-8"?>
 <c:chartSpace xmlns:c="http://schemas.openxmlformats.org/drawingml/2006/chart" xmlns:a="http://schemas.openxmlformats.org/drawingml/2006/main" xmlns:r="http://schemas.openxmlformats.org/officeDocument/2006/relationships" xmlns:c16r2="http://schemas.microsoft.com/office/drawing/2015/06/chart">
   <c:date1904 val="0"/>
-  <c:lang val="en-US"/>
+  <c:lang val="es-ES"/>
   <c:roundedCorners val="0"/>
   <mc:AlternateContent xmlns:mc="http://schemas.openxmlformats.org/markup-compatibility/2006">
     <mc:Choice xmlns:c14="http://schemas.microsoft.com/office/drawing/2007/8/2/chart" Requires="c14">
@@ -2825,7 +2825,7 @@
 <file path=ppt/charts/chart2.xml><?xml version="1.0" encoding="utf-8"?>
 <c:chartSpace xmlns:c="http://schemas.openxmlformats.org/drawingml/2006/chart" xmlns:a="http://schemas.openxmlformats.org/drawingml/2006/main" xmlns:r="http://schemas.openxmlformats.org/officeDocument/2006/relationships" xmlns:c16r2="http://schemas.microsoft.com/office/drawing/2015/06/chart">
   <c:date1904 val="0"/>
-  <c:lang val="en-US"/>
+  <c:lang val="es-ES"/>
   <c:roundedCorners val="0"/>
   <mc:AlternateContent xmlns:mc="http://schemas.openxmlformats.org/markup-compatibility/2006">
     <mc:Choice xmlns:c14="http://schemas.microsoft.com/office/drawing/2007/8/2/chart" Requires="c14">
@@ -3018,7 +3018,7 @@
 <file path=ppt/charts/chart3.xml><?xml version="1.0" encoding="utf-8"?>
 <c:chartSpace xmlns:c="http://schemas.openxmlformats.org/drawingml/2006/chart" xmlns:a="http://schemas.openxmlformats.org/drawingml/2006/main" xmlns:r="http://schemas.openxmlformats.org/officeDocument/2006/relationships" xmlns:c16r2="http://schemas.microsoft.com/office/drawing/2015/06/chart">
   <c:date1904 val="0"/>
-  <c:lang val="en-US"/>
+  <c:lang val="es-ES"/>
   <c:roundedCorners val="0"/>
   <mc:AlternateContent xmlns:mc="http://schemas.openxmlformats.org/markup-compatibility/2006">
     <mc:Choice xmlns:c14="http://schemas.microsoft.com/office/drawing/2007/8/2/chart" Requires="c14">
@@ -3269,7 +3269,7 @@
 <file path=ppt/charts/chart4.xml><?xml version="1.0" encoding="utf-8"?>
 <c:chartSpace xmlns:c="http://schemas.openxmlformats.org/drawingml/2006/chart" xmlns:a="http://schemas.openxmlformats.org/drawingml/2006/main" xmlns:r="http://schemas.openxmlformats.org/officeDocument/2006/relationships" xmlns:c16r2="http://schemas.microsoft.com/office/drawing/2015/06/chart">
   <c:date1904 val="0"/>
-  <c:lang val="en-US"/>
+  <c:lang val="es-ES"/>
   <c:roundedCorners val="0"/>
   <mc:AlternateContent xmlns:mc="http://schemas.openxmlformats.org/markup-compatibility/2006">
     <mc:Choice xmlns:c14="http://schemas.microsoft.com/office/drawing/2007/8/2/chart" Requires="c14">
@@ -3626,7 +3626,7 @@
 <file path=ppt/charts/chart5.xml><?xml version="1.0" encoding="utf-8"?>
 <c:chartSpace xmlns:c="http://schemas.openxmlformats.org/drawingml/2006/chart" xmlns:a="http://schemas.openxmlformats.org/drawingml/2006/main" xmlns:r="http://schemas.openxmlformats.org/officeDocument/2006/relationships" xmlns:c16r2="http://schemas.microsoft.com/office/drawing/2015/06/chart">
   <c:date1904 val="0"/>
-  <c:lang val="en-US"/>
+  <c:lang val="es-ES"/>
   <c:roundedCorners val="0"/>
   <mc:AlternateContent xmlns:mc="http://schemas.openxmlformats.org/markup-compatibility/2006">
     <mc:Choice xmlns:c14="http://schemas.microsoft.com/office/drawing/2007/8/2/chart" Requires="c14">
@@ -3877,7 +3877,7 @@
 <file path=ppt/charts/chart6.xml><?xml version="1.0" encoding="utf-8"?>
 <c:chartSpace xmlns:c="http://schemas.openxmlformats.org/drawingml/2006/chart" xmlns:a="http://schemas.openxmlformats.org/drawingml/2006/main" xmlns:r="http://schemas.openxmlformats.org/officeDocument/2006/relationships" xmlns:c16r2="http://schemas.microsoft.com/office/drawing/2015/06/chart">
   <c:date1904 val="0"/>
-  <c:lang val="en-US"/>
+  <c:lang val="es-ES"/>
   <c:roundedCorners val="0"/>
   <mc:AlternateContent xmlns:mc="http://schemas.openxmlformats.org/markup-compatibility/2006">
     <mc:Choice xmlns:c14="http://schemas.microsoft.com/office/drawing/2007/8/2/chart" Requires="c14">
@@ -4128,7 +4128,7 @@
 <file path=ppt/charts/chart7.xml><?xml version="1.0" encoding="utf-8"?>
 <c:chartSpace xmlns:c="http://schemas.openxmlformats.org/drawingml/2006/chart" xmlns:a="http://schemas.openxmlformats.org/drawingml/2006/main" xmlns:r="http://schemas.openxmlformats.org/officeDocument/2006/relationships" xmlns:c16r2="http://schemas.microsoft.com/office/drawing/2015/06/chart">
   <c:date1904 val="0"/>
-  <c:lang val="en-US"/>
+  <c:lang val="es-ES"/>
   <c:roundedCorners val="0"/>
   <mc:AlternateContent xmlns:mc="http://schemas.openxmlformats.org/markup-compatibility/2006">
     <mc:Choice xmlns:c14="http://schemas.microsoft.com/office/drawing/2007/8/2/chart" Requires="c14">
@@ -4321,7 +4321,7 @@
 <file path=ppt/charts/chart8.xml><?xml version="1.0" encoding="utf-8"?>
 <c:chartSpace xmlns:c="http://schemas.openxmlformats.org/drawingml/2006/chart" xmlns:a="http://schemas.openxmlformats.org/drawingml/2006/main" xmlns:r="http://schemas.openxmlformats.org/officeDocument/2006/relationships" xmlns:c16r2="http://schemas.microsoft.com/office/drawing/2015/06/chart">
   <c:date1904 val="0"/>
-  <c:lang val="en-US"/>
+  <c:lang val="es-ES"/>
   <c:roundedCorners val="0"/>
   <mc:AlternateContent xmlns:mc="http://schemas.openxmlformats.org/markup-compatibility/2006">
     <mc:Choice xmlns:c14="http://schemas.microsoft.com/office/drawing/2007/8/2/chart" Requires="c14">
@@ -4678,7 +4678,7 @@
 <file path=ppt/charts/chart9.xml><?xml version="1.0" encoding="utf-8"?>
 <c:chartSpace xmlns:c="http://schemas.openxmlformats.org/drawingml/2006/chart" xmlns:a="http://schemas.openxmlformats.org/drawingml/2006/main" xmlns:r="http://schemas.openxmlformats.org/officeDocument/2006/relationships" xmlns:c16r2="http://schemas.microsoft.com/office/drawing/2015/06/chart">
   <c:date1904 val="0"/>
-  <c:lang val="en-US"/>
+  <c:lang val="es-ES"/>
   <c:roundedCorners val="0"/>
   <mc:AlternateContent xmlns:mc="http://schemas.openxmlformats.org/markup-compatibility/2006">
     <mc:Choice xmlns:c14="http://schemas.microsoft.com/office/drawing/2007/8/2/chart" Requires="c14">
@@ -9986,7 +9986,7 @@
           <a:p>
             <a:fld id="{2B78B415-2CF0-4B96-B10C-845811E50FD9}" type="datetimeFigureOut">
               <a:rPr lang="es-EC" smtClean="0"/>
-              <a:t>29/8/2025</a:t>
+              <a:t>5/9/2025</a:t>
             </a:fld>
             <a:endParaRPr lang="es-EC"/>
           </a:p>
@@ -10145,7 +10145,7 @@
           <a:p>
             <a:fld id="{71F87569-0DA6-4B98-B5D4-0DE68855C18C}" type="slidenum">
               <a:rPr lang="es-EC" smtClean="0"/>
-              <a:t>‹#›</a:t>
+              <a:t>‹Nº›</a:t>
             </a:fld>
             <a:endParaRPr lang="es-EC"/>
           </a:p>
@@ -10727,7 +10727,7 @@
           <a:p>
             <a:fld id="{07588F61-44D6-44F6-8B2D-C56B5AC40B52}" type="datetimeFigureOut">
               <a:rPr lang="es-EC" smtClean="0"/>
-              <a:t>29/8/2025</a:t>
+              <a:t>5/9/2025</a:t>
             </a:fld>
             <a:endParaRPr lang="es-EC"/>
           </a:p>
@@ -10781,7 +10781,7 @@
           <a:p>
             <a:fld id="{B4B6DC48-50C2-417E-A350-5BE8C4B041A3}" type="slidenum">
               <a:rPr lang="es-EC" smtClean="0"/>
-              <a:t>‹#›</a:t>
+              <a:t>‹Nº›</a:t>
             </a:fld>
             <a:endParaRPr lang="es-EC"/>
           </a:p>
@@ -10927,7 +10927,7 @@
           <a:p>
             <a:fld id="{07588F61-44D6-44F6-8B2D-C56B5AC40B52}" type="datetimeFigureOut">
               <a:rPr lang="es-EC" smtClean="0"/>
-              <a:t>29/8/2025</a:t>
+              <a:t>5/9/2025</a:t>
             </a:fld>
             <a:endParaRPr lang="es-EC"/>
           </a:p>
@@ -10981,7 +10981,7 @@
           <a:p>
             <a:fld id="{B4B6DC48-50C2-417E-A350-5BE8C4B041A3}" type="slidenum">
               <a:rPr lang="es-EC" smtClean="0"/>
-              <a:t>‹#›</a:t>
+              <a:t>‹Nº›</a:t>
             </a:fld>
             <a:endParaRPr lang="es-EC"/>
           </a:p>
@@ -11137,7 +11137,7 @@
           <a:p>
             <a:fld id="{07588F61-44D6-44F6-8B2D-C56B5AC40B52}" type="datetimeFigureOut">
               <a:rPr lang="es-EC" smtClean="0"/>
-              <a:t>29/8/2025</a:t>
+              <a:t>5/9/2025</a:t>
             </a:fld>
             <a:endParaRPr lang="es-EC"/>
           </a:p>
@@ -11191,7 +11191,7 @@
           <a:p>
             <a:fld id="{B4B6DC48-50C2-417E-A350-5BE8C4B041A3}" type="slidenum">
               <a:rPr lang="es-EC" smtClean="0"/>
-              <a:t>‹#›</a:t>
+              <a:t>‹Nº›</a:t>
             </a:fld>
             <a:endParaRPr lang="es-EC"/>
           </a:p>
@@ -11438,7 +11438,7 @@
           <a:p>
             <a:fld id="{07588F61-44D6-44F6-8B2D-C56B5AC40B52}" type="datetimeFigureOut">
               <a:rPr lang="es-EC" smtClean="0"/>
-              <a:t>29/8/2025</a:t>
+              <a:t>5/9/2025</a:t>
             </a:fld>
             <a:endParaRPr lang="es-EC"/>
           </a:p>
@@ -11492,7 +11492,7 @@
           <a:p>
             <a:fld id="{B4B6DC48-50C2-417E-A350-5BE8C4B041A3}" type="slidenum">
               <a:rPr lang="es-EC" smtClean="0"/>
-              <a:t>‹#›</a:t>
+              <a:t>‹Nº›</a:t>
             </a:fld>
             <a:endParaRPr lang="es-EC"/>
           </a:p>
@@ -11714,7 +11714,7 @@
           <a:p>
             <a:fld id="{07588F61-44D6-44F6-8B2D-C56B5AC40B52}" type="datetimeFigureOut">
               <a:rPr lang="es-EC" smtClean="0"/>
-              <a:t>29/8/2025</a:t>
+              <a:t>5/9/2025</a:t>
             </a:fld>
             <a:endParaRPr lang="es-EC"/>
           </a:p>
@@ -11768,7 +11768,7 @@
           <a:p>
             <a:fld id="{B4B6DC48-50C2-417E-A350-5BE8C4B041A3}" type="slidenum">
               <a:rPr lang="es-EC" smtClean="0"/>
-              <a:t>‹#›</a:t>
+              <a:t>‹Nº›</a:t>
             </a:fld>
             <a:endParaRPr lang="es-EC"/>
           </a:p>
@@ -11982,7 +11982,7 @@
           <a:p>
             <a:fld id="{07588F61-44D6-44F6-8B2D-C56B5AC40B52}" type="datetimeFigureOut">
               <a:rPr lang="es-EC" smtClean="0"/>
-              <a:t>29/8/2025</a:t>
+              <a:t>5/9/2025</a:t>
             </a:fld>
             <a:endParaRPr lang="es-EC"/>
           </a:p>
@@ -12036,7 +12036,7 @@
           <a:p>
             <a:fld id="{B4B6DC48-50C2-417E-A350-5BE8C4B041A3}" type="slidenum">
               <a:rPr lang="es-EC" smtClean="0"/>
-              <a:t>‹#›</a:t>
+              <a:t>‹Nº›</a:t>
             </a:fld>
             <a:endParaRPr lang="es-EC"/>
           </a:p>
@@ -12397,7 +12397,7 @@
           <a:p>
             <a:fld id="{07588F61-44D6-44F6-8B2D-C56B5AC40B52}" type="datetimeFigureOut">
               <a:rPr lang="es-EC" smtClean="0"/>
-              <a:t>29/8/2025</a:t>
+              <a:t>5/9/2025</a:t>
             </a:fld>
             <a:endParaRPr lang="es-EC"/>
           </a:p>
@@ -12451,7 +12451,7 @@
           <a:p>
             <a:fld id="{B4B6DC48-50C2-417E-A350-5BE8C4B041A3}" type="slidenum">
               <a:rPr lang="es-EC" smtClean="0"/>
-              <a:t>‹#›</a:t>
+              <a:t>‹Nº›</a:t>
             </a:fld>
             <a:endParaRPr lang="es-EC"/>
           </a:p>
@@ -12539,7 +12539,7 @@
           <a:p>
             <a:fld id="{07588F61-44D6-44F6-8B2D-C56B5AC40B52}" type="datetimeFigureOut">
               <a:rPr lang="es-EC" smtClean="0"/>
-              <a:t>29/8/2025</a:t>
+              <a:t>5/9/2025</a:t>
             </a:fld>
             <a:endParaRPr lang="es-EC"/>
           </a:p>
@@ -12593,7 +12593,7 @@
           <a:p>
             <a:fld id="{B4B6DC48-50C2-417E-A350-5BE8C4B041A3}" type="slidenum">
               <a:rPr lang="es-EC" smtClean="0"/>
-              <a:t>‹#›</a:t>
+              <a:t>‹Nº›</a:t>
             </a:fld>
             <a:endParaRPr lang="es-EC"/>
           </a:p>
@@ -12652,7 +12652,7 @@
           <a:p>
             <a:fld id="{07588F61-44D6-44F6-8B2D-C56B5AC40B52}" type="datetimeFigureOut">
               <a:rPr lang="es-EC" smtClean="0"/>
-              <a:t>29/8/2025</a:t>
+              <a:t>5/9/2025</a:t>
             </a:fld>
             <a:endParaRPr lang="es-EC"/>
           </a:p>
@@ -12706,7 +12706,7 @@
           <a:p>
             <a:fld id="{B4B6DC48-50C2-417E-A350-5BE8C4B041A3}" type="slidenum">
               <a:rPr lang="es-EC" smtClean="0"/>
-              <a:t>‹#›</a:t>
+              <a:t>‹Nº›</a:t>
             </a:fld>
             <a:endParaRPr lang="es-EC"/>
           </a:p>
@@ -12965,7 +12965,7 @@
           <a:p>
             <a:fld id="{07588F61-44D6-44F6-8B2D-C56B5AC40B52}" type="datetimeFigureOut">
               <a:rPr lang="es-EC" smtClean="0"/>
-              <a:t>29/8/2025</a:t>
+              <a:t>5/9/2025</a:t>
             </a:fld>
             <a:endParaRPr lang="es-EC"/>
           </a:p>
@@ -13019,7 +13019,7 @@
           <a:p>
             <a:fld id="{B4B6DC48-50C2-417E-A350-5BE8C4B041A3}" type="slidenum">
               <a:rPr lang="es-EC" smtClean="0"/>
-              <a:t>‹#›</a:t>
+              <a:t>‹Nº›</a:t>
             </a:fld>
             <a:endParaRPr lang="es-EC"/>
           </a:p>
@@ -13254,7 +13254,7 @@
           <a:p>
             <a:fld id="{07588F61-44D6-44F6-8B2D-C56B5AC40B52}" type="datetimeFigureOut">
               <a:rPr lang="es-EC" smtClean="0"/>
-              <a:t>29/8/2025</a:t>
+              <a:t>5/9/2025</a:t>
             </a:fld>
             <a:endParaRPr lang="es-EC"/>
           </a:p>
@@ -13308,7 +13308,7 @@
           <a:p>
             <a:fld id="{B4B6DC48-50C2-417E-A350-5BE8C4B041A3}" type="slidenum">
               <a:rPr lang="es-EC" smtClean="0"/>
-              <a:t>‹#›</a:t>
+              <a:t>‹Nº›</a:t>
             </a:fld>
             <a:endParaRPr lang="es-EC"/>
           </a:p>
@@ -13497,7 +13497,7 @@
           <a:p>
             <a:fld id="{07588F61-44D6-44F6-8B2D-C56B5AC40B52}" type="datetimeFigureOut">
               <a:rPr lang="es-EC" smtClean="0"/>
-              <a:t>29/8/2025</a:t>
+              <a:t>5/9/2025</a:t>
             </a:fld>
             <a:endParaRPr lang="es-EC"/>
           </a:p>
@@ -13587,7 +13587,7 @@
           <a:p>
             <a:fld id="{B4B6DC48-50C2-417E-A350-5BE8C4B041A3}" type="slidenum">
               <a:rPr lang="es-EC" smtClean="0"/>
-              <a:t>‹#›</a:t>
+              <a:t>‹Nº›</a:t>
             </a:fld>
             <a:endParaRPr lang="es-EC"/>
           </a:p>
@@ -24523,7 +24523,7 @@
           <p:nvPr>
             <p:extLst>
               <p:ext uri="{D42A27DB-BD31-4B8C-83A1-F6EECF244321}">
-                <p14:modId xmlns:p14="http://schemas.microsoft.com/office/powerpoint/2010/main" val="3426550415"/>
+                <p14:modId xmlns:p14="http://schemas.microsoft.com/office/powerpoint/2010/main" val="2434163929"/>
               </p:ext>
             </p:extLst>
           </p:nvPr>
@@ -24948,7 +24948,7 @@
                         <a:defRPr/>
                       </a:pPr>
                       <a:r>
-                        <a:rPr lang="es-MX" sz="1000" kern="100">
+                        <a:rPr lang="es-MX" sz="1000" kern="100" dirty="0">
                           <a:solidFill>
                             <a:schemeClr val="tx1"/>
                           </a:solidFill>
@@ -24957,7 +24957,7 @@
                           <a:ea typeface="Aptos" panose="020B0004020202020204" pitchFamily="34" charset="0"/>
                           <a:cs typeface="Times New Roman" panose="02020603050405020304" pitchFamily="18" charset="0"/>
                         </a:rPr>
-                        <a:t>La búsqueda en los términos asociados al programa es media, lo que muestra moderado interés en el programa, lo que significa que se debe buscar variables mas llamativas para la propuesta.</a:t>
+                        <a:t>La búsqueda en los términos asociados al programa es media, lo que muestra moderado interés en el programa, lo que significa que se debe buscar variables más llamativas para la propuesta.</a:t>
                       </a:r>
                     </a:p>
                   </a:txBody>
@@ -25010,18 +25010,18 @@
                     <a:p>
                       <a:pPr algn="ctr"/>
                       <a:r>
-                        <a:rPr lang="es-MX" sz="1000">
+                        <a:rPr lang="es-MX" sz="1000" dirty="0">
                           <a:solidFill>
                             <a:schemeClr val="tx1"/>
                           </a:solidFill>
                           <a:latin typeface="Century Gothic" panose="020B0502020202020204" pitchFamily="34" charset="0"/>
                         </a:rPr>
-                        <a:t>El porcentaje de competencia es medio ya que, a pesar que tiene alto interés, muestra alta competencia con otras universidades</a:t>
+                        <a:t>El porcentaje de competencia es medio ya que, a pesar de que tiene alto interés, muestra alta competencia con otras universidades</a:t>
                       </a:r>
                     </a:p>
                     <a:p>
                       <a:pPr algn="ctr"/>
-                      <a:endParaRPr lang="es-EC" sz="1000">
+                      <a:endParaRPr lang="es-EC" sz="1000" dirty="0">
                         <a:solidFill>
                           <a:schemeClr val="tx1"/>
                         </a:solidFill>
@@ -25275,7 +25275,7 @@
                         <a:defRPr/>
                       </a:pPr>
                       <a:r>
-                        <a:rPr lang="es-MX" sz="1000" kern="100">
+                        <a:rPr lang="es-MX" sz="1000" kern="100" dirty="0">
                           <a:solidFill>
                             <a:schemeClr val="tx1"/>
                           </a:solidFill>
@@ -25289,7 +25289,7 @@
                     </a:p>
                     <a:p>
                       <a:pPr algn="ctr"/>
-                      <a:endParaRPr lang="es-EC" sz="1000">
+                      <a:endParaRPr lang="es-EC" sz="1000" dirty="0">
                         <a:solidFill>
                           <a:schemeClr val="tx1"/>
                         </a:solidFill>
@@ -27699,7 +27699,7 @@
           <a:p>
             <a:pPr algn="ctr"/>
             <a:r>
-              <a:rPr lang="es-EC" b="1">
+              <a:rPr lang="es-EC" b="1" dirty="0">
                 <a:solidFill>
                   <a:schemeClr val="accent6"/>
                 </a:solidFill>
@@ -27708,7 +27708,7 @@
               <a:t>Viable:</a:t>
             </a:r>
             <a:r>
-              <a:rPr lang="es-EC">
+              <a:rPr lang="es-EC" dirty="0">
                 <a:solidFill>
                   <a:schemeClr val="accent6"/>
                 </a:solidFill>
@@ -32703,15 +32703,6 @@
 </file>
 
 <file path=customXml/item2.xml><?xml version="1.0" encoding="utf-8"?>
-<?mso-contentType ?>
-<FormTemplates xmlns="http://schemas.microsoft.com/sharepoint/v3/contenttype/forms">
-  <Display>DocumentLibraryForm</Display>
-  <Edit>DocumentLibraryForm</Edit>
-  <New>DocumentLibraryForm</New>
-</FormTemplates>
-</file>
-
-<file path=customXml/item3.xml><?xml version="1.0" encoding="utf-8"?>
 <ct:contentTypeSchema xmlns:ct="http://schemas.microsoft.com/office/2006/metadata/contentType" xmlns:ma="http://schemas.microsoft.com/office/2006/metadata/properties/metaAttributes" ct:_="" ma:_="" ma:contentTypeName="Document" ma:contentTypeID="0x0101008B79CFD9EF6F644CBD47F0B73559073B" ma:contentTypeVersion="15" ma:contentTypeDescription="Create a new document." ma:contentTypeScope="" ma:versionID="6fe4cea0417729621407aba7d2025865">
   <xsd:schema xmlns:xsd="http://www.w3.org/2001/XMLSchema" xmlns:xs="http://www.w3.org/2001/XMLSchema" xmlns:p="http://schemas.microsoft.com/office/2006/metadata/properties" xmlns:ns3="2a3a48df-fd5a-482e-a9d8-c269fe9c14b6" xmlns:ns4="51658deb-57f9-4180-84d3-54f6c7d5e26c" targetNamespace="http://schemas.microsoft.com/office/2006/metadata/properties" ma:root="true" ma:fieldsID="ab0162d20e29b1c27892af52d7457169" ns3:_="" ns4:_="">
     <xsd:import namespace="2a3a48df-fd5a-482e-a9d8-c269fe9c14b6"/>
@@ -32944,6 +32935,15 @@
 </ct:contentTypeSchema>
 </file>
 
+<file path=customXml/item3.xml><?xml version="1.0" encoding="utf-8"?>
+<?mso-contentType ?>
+<FormTemplates xmlns="http://schemas.microsoft.com/sharepoint/v3/contenttype/forms">
+  <Display>DocumentLibraryForm</Display>
+  <Edit>DocumentLibraryForm</Edit>
+  <New>DocumentLibraryForm</New>
+</FormTemplates>
+</file>
+
 <file path=customXml/itemProps1.xml><?xml version="1.0" encoding="utf-8"?>
 <ds:datastoreItem xmlns:ds="http://schemas.openxmlformats.org/officeDocument/2006/customXml" ds:itemID="{C3961526-4550-4B91-9CB0-38571E77D286}">
   <ds:schemaRefs>
@@ -32962,14 +32962,6 @@
 </file>
 
 <file path=customXml/itemProps2.xml><?xml version="1.0" encoding="utf-8"?>
-<ds:datastoreItem xmlns:ds="http://schemas.openxmlformats.org/officeDocument/2006/customXml" ds:itemID="{6F6047D2-D757-4EBF-8A4E-358354D46A6D}">
-  <ds:schemaRefs>
-    <ds:schemaRef ds:uri="http://schemas.microsoft.com/sharepoint/v3/contenttype/forms"/>
-  </ds:schemaRefs>
-</ds:datastoreItem>
-</file>
-
-<file path=customXml/itemProps3.xml><?xml version="1.0" encoding="utf-8"?>
 <ds:datastoreItem xmlns:ds="http://schemas.openxmlformats.org/officeDocument/2006/customXml" ds:itemID="{065B68F9-2A09-4CDE-AC71-4E4669D8024B}">
   <ds:schemaRefs>
     <ds:schemaRef ds:uri="2a3a48df-fd5a-482e-a9d8-c269fe9c14b6"/>
@@ -32986,4 +32978,12 @@
     <ds:schemaRef ds:uri="http://www.w3.org/2001/XMLSchema"/>
   </ds:schemaRefs>
 </ds:datastoreItem>
+</file>
+
+<file path=customXml/itemProps3.xml><?xml version="1.0" encoding="utf-8"?>
+<ds:datastoreItem xmlns:ds="http://schemas.openxmlformats.org/officeDocument/2006/customXml" ds:itemID="{6F6047D2-D757-4EBF-8A4E-358354D46A6D}">
+  <ds:schemaRefs>
+    <ds:schemaRef ds:uri="http://schemas.microsoft.com/sharepoint/v3/contenttype/forms"/>
+  </ds:schemaRefs>
+</ds:datastoreItem>
 </file>
</xml_diff>